<commit_message>
:memo:docs: Updated ppt and docs file:construction:
</commit_message>
<xml_diff>
--- a/Docs_Work/presentation.pptx
+++ b/Docs_Work/presentation.pptx
@@ -182,7 +182,7 @@
           <a:noFill/>
           <a:extLst>
             <a:ext uri="{909E8E84-426E-40dd-AFC4-6F175D3DCCD1}">
-              <a14:hiddenFill xmlns="" xmlns:a14="http://schemas.microsoft.com/office/drawing/2010/main">
+              <a14:hiddenFill xmlns:a14="http://schemas.microsoft.com/office/drawing/2010/main" xmlns="">
                 <a:solidFill>
                   <a:srgbClr val="FFFFFF"/>
                 </a:solidFill>
@@ -241,7 +241,7 @@
             </a:ln>
             <a:extLst>
               <a:ext uri="{91240B29-F687-4f45-9708-019B960494DF}">
-                <a14:hiddenLine xmlns="" xmlns:a14="http://schemas.microsoft.com/office/drawing/2010/main" w="9525">
+                <a14:hiddenLine xmlns:a14="http://schemas.microsoft.com/office/drawing/2010/main" xmlns="" w="9525">
                   <a:solidFill>
                     <a:srgbClr val="000000"/>
                   </a:solidFill>
@@ -331,7 +331,7 @@
             </a:ln>
             <a:extLst>
               <a:ext uri="{91240B29-F687-4f45-9708-019B960494DF}">
-                <a14:hiddenLine xmlns="" xmlns:a14="http://schemas.microsoft.com/office/drawing/2010/main" w="9525">
+                <a14:hiddenLine xmlns:a14="http://schemas.microsoft.com/office/drawing/2010/main" xmlns="" w="9525">
                   <a:solidFill>
                     <a:srgbClr val="000000"/>
                   </a:solidFill>
@@ -421,7 +421,7 @@
             </a:ln>
             <a:extLst>
               <a:ext uri="{91240B29-F687-4f45-9708-019B960494DF}">
-                <a14:hiddenLine xmlns="" xmlns:a14="http://schemas.microsoft.com/office/drawing/2010/main" w="9525">
+                <a14:hiddenLine xmlns:a14="http://schemas.microsoft.com/office/drawing/2010/main" xmlns="" w="9525">
                   <a:solidFill>
                     <a:srgbClr val="000000"/>
                   </a:solidFill>
@@ -455,7 +455,7 @@
             </a:ln>
             <a:extLst>
               <a:ext uri="{91240B29-F687-4f45-9708-019B960494DF}">
-                <a14:hiddenLine xmlns="" xmlns:a14="http://schemas.microsoft.com/office/drawing/2010/main" w="9525">
+                <a14:hiddenLine xmlns:a14="http://schemas.microsoft.com/office/drawing/2010/main" xmlns="" w="9525">
                   <a:solidFill>
                     <a:srgbClr val="000000"/>
                   </a:solidFill>
@@ -545,7 +545,7 @@
             </a:ln>
             <a:extLst>
               <a:ext uri="{91240B29-F687-4f45-9708-019B960494DF}">
-                <a14:hiddenLine xmlns="" xmlns:a14="http://schemas.microsoft.com/office/drawing/2010/main" w="9525">
+                <a14:hiddenLine xmlns:a14="http://schemas.microsoft.com/office/drawing/2010/main" xmlns="" w="9525">
                   <a:solidFill>
                     <a:srgbClr val="000000"/>
                   </a:solidFill>
@@ -607,7 +607,7 @@
             </a:ln>
             <a:extLst>
               <a:ext uri="{91240B29-F687-4f45-9708-019B960494DF}">
-                <a14:hiddenLine xmlns="" xmlns:a14="http://schemas.microsoft.com/office/drawing/2010/main" w="9525">
+                <a14:hiddenLine xmlns:a14="http://schemas.microsoft.com/office/drawing/2010/main" xmlns="" w="9525">
                   <a:solidFill>
                     <a:srgbClr val="000000"/>
                   </a:solidFill>
@@ -669,7 +669,7 @@
             </a:ln>
             <a:extLst>
               <a:ext uri="{91240B29-F687-4f45-9708-019B960494DF}">
-                <a14:hiddenLine xmlns="" xmlns:a14="http://schemas.microsoft.com/office/drawing/2010/main" w="9525">
+                <a14:hiddenLine xmlns:a14="http://schemas.microsoft.com/office/drawing/2010/main" xmlns="" w="9525">
                   <a:solidFill>
                     <a:srgbClr val="000000"/>
                   </a:solidFill>
@@ -759,7 +759,7 @@
             </a:ln>
             <a:extLst>
               <a:ext uri="{91240B29-F687-4f45-9708-019B960494DF}">
-                <a14:hiddenLine xmlns="" xmlns:a14="http://schemas.microsoft.com/office/drawing/2010/main" w="9525">
+                <a14:hiddenLine xmlns:a14="http://schemas.microsoft.com/office/drawing/2010/main" xmlns="" w="9525">
                   <a:solidFill>
                     <a:srgbClr val="000000"/>
                   </a:solidFill>
@@ -821,7 +821,7 @@
             </a:ln>
             <a:extLst>
               <a:ext uri="{91240B29-F687-4f45-9708-019B960494DF}">
-                <a14:hiddenLine xmlns="" xmlns:a14="http://schemas.microsoft.com/office/drawing/2010/main" w="9525">
+                <a14:hiddenLine xmlns:a14="http://schemas.microsoft.com/office/drawing/2010/main" xmlns="" w="9525">
                   <a:solidFill>
                     <a:srgbClr val="000000"/>
                   </a:solidFill>
@@ -883,7 +883,7 @@
             </a:ln>
             <a:extLst>
               <a:ext uri="{91240B29-F687-4f45-9708-019B960494DF}">
-                <a14:hiddenLine xmlns="" xmlns:a14="http://schemas.microsoft.com/office/drawing/2010/main" w="9525">
+                <a14:hiddenLine xmlns:a14="http://schemas.microsoft.com/office/drawing/2010/main" xmlns="" w="9525">
                   <a:solidFill>
                     <a:srgbClr val="000000"/>
                   </a:solidFill>
@@ -973,7 +973,7 @@
             </a:ln>
             <a:extLst>
               <a:ext uri="{91240B29-F687-4f45-9708-019B960494DF}">
-                <a14:hiddenLine xmlns="" xmlns:a14="http://schemas.microsoft.com/office/drawing/2010/main" w="9525">
+                <a14:hiddenLine xmlns:a14="http://schemas.microsoft.com/office/drawing/2010/main" xmlns="" w="9525">
                   <a:solidFill>
                     <a:srgbClr val="000000"/>
                   </a:solidFill>
@@ -1063,7 +1063,7 @@
             </a:ln>
             <a:extLst>
               <a:ext uri="{91240B29-F687-4f45-9708-019B960494DF}">
-                <a14:hiddenLine xmlns="" xmlns:a14="http://schemas.microsoft.com/office/drawing/2010/main" w="9525">
+                <a14:hiddenLine xmlns:a14="http://schemas.microsoft.com/office/drawing/2010/main" xmlns="" w="9525">
                   <a:solidFill>
                     <a:srgbClr val="000000"/>
                   </a:solidFill>
@@ -1125,7 +1125,7 @@
             </a:ln>
             <a:extLst>
               <a:ext uri="{91240B29-F687-4f45-9708-019B960494DF}">
-                <a14:hiddenLine xmlns="" xmlns:a14="http://schemas.microsoft.com/office/drawing/2010/main" w="9525">
+                <a14:hiddenLine xmlns:a14="http://schemas.microsoft.com/office/drawing/2010/main" xmlns="" w="9525">
                   <a:solidFill>
                     <a:srgbClr val="000000"/>
                   </a:solidFill>
@@ -1235,7 +1235,7 @@
             </a:ln>
             <a:extLst>
               <a:ext uri="{91240B29-F687-4f45-9708-019B960494DF}">
-                <a14:hiddenLine xmlns="" xmlns:a14="http://schemas.microsoft.com/office/drawing/2010/main" w="9525">
+                <a14:hiddenLine xmlns:a14="http://schemas.microsoft.com/office/drawing/2010/main" xmlns="" w="9525">
                   <a:solidFill>
                     <a:srgbClr val="000000"/>
                   </a:solidFill>
@@ -1297,7 +1297,7 @@
             </a:ln>
             <a:extLst>
               <a:ext uri="{91240B29-F687-4f45-9708-019B960494DF}">
-                <a14:hiddenLine xmlns="" xmlns:a14="http://schemas.microsoft.com/office/drawing/2010/main" w="9525">
+                <a14:hiddenLine xmlns:a14="http://schemas.microsoft.com/office/drawing/2010/main" xmlns="" w="9525">
                   <a:solidFill>
                     <a:srgbClr val="000000"/>
                   </a:solidFill>
@@ -1387,7 +1387,7 @@
             </a:ln>
             <a:extLst>
               <a:ext uri="{91240B29-F687-4f45-9708-019B960494DF}">
-                <a14:hiddenLine xmlns="" xmlns:a14="http://schemas.microsoft.com/office/drawing/2010/main" w="9525">
+                <a14:hiddenLine xmlns:a14="http://schemas.microsoft.com/office/drawing/2010/main" xmlns="" w="9525">
                   <a:solidFill>
                     <a:srgbClr val="000000"/>
                   </a:solidFill>
@@ -1477,7 +1477,7 @@
             </a:ln>
             <a:extLst>
               <a:ext uri="{91240B29-F687-4f45-9708-019B960494DF}">
-                <a14:hiddenLine xmlns="" xmlns:a14="http://schemas.microsoft.com/office/drawing/2010/main" w="9525">
+                <a14:hiddenLine xmlns:a14="http://schemas.microsoft.com/office/drawing/2010/main" xmlns="" w="9525">
                   <a:solidFill>
                     <a:srgbClr val="000000"/>
                   </a:solidFill>
@@ -1539,7 +1539,7 @@
             </a:ln>
             <a:extLst>
               <a:ext uri="{91240B29-F687-4f45-9708-019B960494DF}">
-                <a14:hiddenLine xmlns="" xmlns:a14="http://schemas.microsoft.com/office/drawing/2010/main" w="9525">
+                <a14:hiddenLine xmlns:a14="http://schemas.microsoft.com/office/drawing/2010/main" xmlns="" w="9525">
                   <a:solidFill>
                     <a:srgbClr val="000000"/>
                   </a:solidFill>
@@ -1629,7 +1629,7 @@
             </a:ln>
             <a:extLst>
               <a:ext uri="{91240B29-F687-4f45-9708-019B960494DF}">
-                <a14:hiddenLine xmlns="" xmlns:a14="http://schemas.microsoft.com/office/drawing/2010/main" w="9525">
+                <a14:hiddenLine xmlns:a14="http://schemas.microsoft.com/office/drawing/2010/main" xmlns="" w="9525">
                   <a:solidFill>
                     <a:srgbClr val="000000"/>
                   </a:solidFill>
@@ -1719,7 +1719,7 @@
             </a:ln>
             <a:extLst>
               <a:ext uri="{91240B29-F687-4f45-9708-019B960494DF}">
-                <a14:hiddenLine xmlns="" xmlns:a14="http://schemas.microsoft.com/office/drawing/2010/main" w="9525">
+                <a14:hiddenLine xmlns:a14="http://schemas.microsoft.com/office/drawing/2010/main" xmlns="" w="9525">
                   <a:solidFill>
                     <a:srgbClr val="000000"/>
                   </a:solidFill>
@@ -1775,7 +1775,7 @@
             </a:ln>
             <a:extLst>
               <a:ext uri="{91240B29-F687-4f45-9708-019B960494DF}">
-                <a14:hiddenLine xmlns="" xmlns:a14="http://schemas.microsoft.com/office/drawing/2010/main" w="9525">
+                <a14:hiddenLine xmlns:a14="http://schemas.microsoft.com/office/drawing/2010/main" xmlns="" w="9525">
                   <a:solidFill>
                     <a:srgbClr val="000000"/>
                   </a:solidFill>
@@ -1865,7 +1865,7 @@
             </a:ln>
             <a:extLst>
               <a:ext uri="{91240B29-F687-4f45-9708-019B960494DF}">
-                <a14:hiddenLine xmlns="" xmlns:a14="http://schemas.microsoft.com/office/drawing/2010/main" w="9525">
+                <a14:hiddenLine xmlns:a14="http://schemas.microsoft.com/office/drawing/2010/main" xmlns="" w="9525">
                   <a:solidFill>
                     <a:srgbClr val="000000"/>
                   </a:solidFill>
@@ -1921,7 +1921,7 @@
             </a:ln>
             <a:extLst>
               <a:ext uri="{91240B29-F687-4f45-9708-019B960494DF}">
-                <a14:hiddenLine xmlns="" xmlns:a14="http://schemas.microsoft.com/office/drawing/2010/main" w="9525">
+                <a14:hiddenLine xmlns:a14="http://schemas.microsoft.com/office/drawing/2010/main" xmlns="" w="9525">
                   <a:solidFill>
                     <a:srgbClr val="000000"/>
                   </a:solidFill>
@@ -2011,7 +2011,7 @@
             </a:ln>
             <a:extLst>
               <a:ext uri="{91240B29-F687-4f45-9708-019B960494DF}">
-                <a14:hiddenLine xmlns="" xmlns:a14="http://schemas.microsoft.com/office/drawing/2010/main" w="9525">
+                <a14:hiddenLine xmlns:a14="http://schemas.microsoft.com/office/drawing/2010/main" xmlns="" w="9525">
                   <a:solidFill>
                     <a:srgbClr val="000000"/>
                   </a:solidFill>
@@ -2079,7 +2079,7 @@
             </a:ln>
             <a:extLst>
               <a:ext uri="{91240B29-F687-4f45-9708-019B960494DF}">
-                <a14:hiddenLine xmlns="" xmlns:a14="http://schemas.microsoft.com/office/drawing/2010/main" w="9525">
+                <a14:hiddenLine xmlns:a14="http://schemas.microsoft.com/office/drawing/2010/main" xmlns="" w="9525">
                   <a:solidFill>
                     <a:srgbClr val="000000"/>
                   </a:solidFill>
@@ -2169,7 +2169,7 @@
             </a:ln>
             <a:extLst>
               <a:ext uri="{91240B29-F687-4f45-9708-019B960494DF}">
-                <a14:hiddenLine xmlns="" xmlns:a14="http://schemas.microsoft.com/office/drawing/2010/main" w="9525">
+                <a14:hiddenLine xmlns:a14="http://schemas.microsoft.com/office/drawing/2010/main" xmlns="" w="9525">
                   <a:solidFill>
                     <a:srgbClr val="000000"/>
                   </a:solidFill>
@@ -2237,7 +2237,7 @@
             </a:ln>
             <a:extLst>
               <a:ext uri="{91240B29-F687-4f45-9708-019B960494DF}">
-                <a14:hiddenLine xmlns="" xmlns:a14="http://schemas.microsoft.com/office/drawing/2010/main" w="9525">
+                <a14:hiddenLine xmlns:a14="http://schemas.microsoft.com/office/drawing/2010/main" xmlns="" w="9525">
                   <a:solidFill>
                     <a:srgbClr val="000000"/>
                   </a:solidFill>
@@ -2327,7 +2327,7 @@
             </a:ln>
             <a:extLst>
               <a:ext uri="{91240B29-F687-4f45-9708-019B960494DF}">
-                <a14:hiddenLine xmlns="" xmlns:a14="http://schemas.microsoft.com/office/drawing/2010/main" w="9525">
+                <a14:hiddenLine xmlns:a14="http://schemas.microsoft.com/office/drawing/2010/main" xmlns="" w="9525">
                   <a:solidFill>
                     <a:srgbClr val="000000"/>
                   </a:solidFill>
@@ -2361,7 +2361,7 @@
             </a:ln>
             <a:extLst>
               <a:ext uri="{91240B29-F687-4f45-9708-019B960494DF}">
-                <a14:hiddenLine xmlns="" xmlns:a14="http://schemas.microsoft.com/office/drawing/2010/main" w="9525">
+                <a14:hiddenLine xmlns:a14="http://schemas.microsoft.com/office/drawing/2010/main" xmlns="" w="9525">
                   <a:solidFill>
                     <a:srgbClr val="000000"/>
                   </a:solidFill>
@@ -2451,7 +2451,7 @@
             </a:ln>
             <a:extLst>
               <a:ext uri="{91240B29-F687-4f45-9708-019B960494DF}">
-                <a14:hiddenLine xmlns="" xmlns:a14="http://schemas.microsoft.com/office/drawing/2010/main" w="9525">
+                <a14:hiddenLine xmlns:a14="http://schemas.microsoft.com/office/drawing/2010/main" xmlns="" w="9525">
                   <a:solidFill>
                     <a:srgbClr val="000000"/>
                   </a:solidFill>
@@ -2513,7 +2513,7 @@
             </a:ln>
             <a:extLst>
               <a:ext uri="{91240B29-F687-4f45-9708-019B960494DF}">
-                <a14:hiddenLine xmlns="" xmlns:a14="http://schemas.microsoft.com/office/drawing/2010/main" w="9525">
+                <a14:hiddenLine xmlns:a14="http://schemas.microsoft.com/office/drawing/2010/main" xmlns="" w="9525">
                   <a:solidFill>
                     <a:srgbClr val="000000"/>
                   </a:solidFill>
@@ -2575,7 +2575,7 @@
             </a:ln>
             <a:extLst>
               <a:ext uri="{91240B29-F687-4f45-9708-019B960494DF}">
-                <a14:hiddenLine xmlns="" xmlns:a14="http://schemas.microsoft.com/office/drawing/2010/main" w="9525">
+                <a14:hiddenLine xmlns:a14="http://schemas.microsoft.com/office/drawing/2010/main" xmlns="" w="9525">
                   <a:solidFill>
                     <a:srgbClr val="000000"/>
                   </a:solidFill>
@@ -2665,7 +2665,7 @@
             </a:ln>
             <a:extLst>
               <a:ext uri="{91240B29-F687-4f45-9708-019B960494DF}">
-                <a14:hiddenLine xmlns="" xmlns:a14="http://schemas.microsoft.com/office/drawing/2010/main" w="9525">
+                <a14:hiddenLine xmlns:a14="http://schemas.microsoft.com/office/drawing/2010/main" xmlns="" w="9525">
                   <a:solidFill>
                     <a:srgbClr val="000000"/>
                   </a:solidFill>
@@ -2733,7 +2733,7 @@
             </a:ln>
             <a:extLst>
               <a:ext uri="{91240B29-F687-4f45-9708-019B960494DF}">
-                <a14:hiddenLine xmlns="" xmlns:a14="http://schemas.microsoft.com/office/drawing/2010/main" w="9525">
+                <a14:hiddenLine xmlns:a14="http://schemas.microsoft.com/office/drawing/2010/main" xmlns="" w="9525">
                   <a:solidFill>
                     <a:srgbClr val="000000"/>
                   </a:solidFill>
@@ -2795,7 +2795,7 @@
             </a:ln>
             <a:extLst>
               <a:ext uri="{91240B29-F687-4f45-9708-019B960494DF}">
-                <a14:hiddenLine xmlns="" xmlns:a14="http://schemas.microsoft.com/office/drawing/2010/main" w="9525">
+                <a14:hiddenLine xmlns:a14="http://schemas.microsoft.com/office/drawing/2010/main" xmlns="" w="9525">
                   <a:solidFill>
                     <a:srgbClr val="000000"/>
                   </a:solidFill>
@@ -2885,7 +2885,7 @@
             </a:ln>
             <a:extLst>
               <a:ext uri="{91240B29-F687-4f45-9708-019B960494DF}">
-                <a14:hiddenLine xmlns="" xmlns:a14="http://schemas.microsoft.com/office/drawing/2010/main" w="9525">
+                <a14:hiddenLine xmlns:a14="http://schemas.microsoft.com/office/drawing/2010/main" xmlns="" w="9525">
                   <a:solidFill>
                     <a:srgbClr val="000000"/>
                   </a:solidFill>
@@ -2947,7 +2947,7 @@
             </a:ln>
             <a:extLst>
               <a:ext uri="{91240B29-F687-4f45-9708-019B960494DF}">
-                <a14:hiddenLine xmlns="" xmlns:a14="http://schemas.microsoft.com/office/drawing/2010/main" w="9525">
+                <a14:hiddenLine xmlns:a14="http://schemas.microsoft.com/office/drawing/2010/main" xmlns="" w="9525">
                   <a:solidFill>
                     <a:srgbClr val="000000"/>
                   </a:solidFill>
@@ -3037,7 +3037,7 @@
             </a:ln>
             <a:extLst>
               <a:ext uri="{91240B29-F687-4f45-9708-019B960494DF}">
-                <a14:hiddenLine xmlns="" xmlns:a14="http://schemas.microsoft.com/office/drawing/2010/main" w="9525">
+                <a14:hiddenLine xmlns:a14="http://schemas.microsoft.com/office/drawing/2010/main" xmlns="" w="9525">
                   <a:solidFill>
                     <a:srgbClr val="000000"/>
                   </a:solidFill>
@@ -3099,7 +3099,7 @@
             </a:ln>
             <a:extLst>
               <a:ext uri="{91240B29-F687-4f45-9708-019B960494DF}">
-                <a14:hiddenLine xmlns="" xmlns:a14="http://schemas.microsoft.com/office/drawing/2010/main" w="9525">
+                <a14:hiddenLine xmlns:a14="http://schemas.microsoft.com/office/drawing/2010/main" xmlns="" w="9525">
                   <a:solidFill>
                     <a:srgbClr val="000000"/>
                   </a:solidFill>
@@ -3189,7 +3189,7 @@
             </a:ln>
             <a:extLst>
               <a:ext uri="{91240B29-F687-4f45-9708-019B960494DF}">
-                <a14:hiddenLine xmlns="" xmlns:a14="http://schemas.microsoft.com/office/drawing/2010/main" w="9525">
+                <a14:hiddenLine xmlns:a14="http://schemas.microsoft.com/office/drawing/2010/main" xmlns="" w="9525">
                   <a:solidFill>
                     <a:srgbClr val="000000"/>
                   </a:solidFill>
@@ -3223,7 +3223,7 @@
             </a:ln>
             <a:extLst>
               <a:ext uri="{91240B29-F687-4f45-9708-019B960494DF}">
-                <a14:hiddenLine xmlns="" xmlns:a14="http://schemas.microsoft.com/office/drawing/2010/main" w="9525">
+                <a14:hiddenLine xmlns:a14="http://schemas.microsoft.com/office/drawing/2010/main" xmlns="" w="9525">
                   <a:solidFill>
                     <a:srgbClr val="000000"/>
                   </a:solidFill>
@@ -3288,7 +3288,7 @@
             </a:ln>
             <a:extLst>
               <a:ext uri="{91240B29-F687-4f45-9708-019B960494DF}">
-                <a14:hiddenLine xmlns="" xmlns:a14="http://schemas.microsoft.com/office/drawing/2010/main" w="9525">
+                <a14:hiddenLine xmlns:a14="http://schemas.microsoft.com/office/drawing/2010/main" xmlns="" w="9525">
                   <a:solidFill>
                     <a:srgbClr val="000000"/>
                   </a:solidFill>
@@ -3378,7 +3378,7 @@
             </a:ln>
             <a:extLst>
               <a:ext uri="{91240B29-F687-4f45-9708-019B960494DF}">
-                <a14:hiddenLine xmlns="" xmlns:a14="http://schemas.microsoft.com/office/drawing/2010/main" w="9525">
+                <a14:hiddenLine xmlns:a14="http://schemas.microsoft.com/office/drawing/2010/main" xmlns="" w="9525">
                   <a:solidFill>
                     <a:srgbClr val="000000"/>
                   </a:solidFill>
@@ -3440,7 +3440,7 @@
             </a:ln>
             <a:extLst>
               <a:ext uri="{91240B29-F687-4f45-9708-019B960494DF}">
-                <a14:hiddenLine xmlns="" xmlns:a14="http://schemas.microsoft.com/office/drawing/2010/main" w="9525">
+                <a14:hiddenLine xmlns:a14="http://schemas.microsoft.com/office/drawing/2010/main" xmlns="" w="9525">
                   <a:solidFill>
                     <a:srgbClr val="000000"/>
                   </a:solidFill>
@@ -3530,7 +3530,7 @@
             </a:ln>
             <a:extLst>
               <a:ext uri="{91240B29-F687-4f45-9708-019B960494DF}">
-                <a14:hiddenLine xmlns="" xmlns:a14="http://schemas.microsoft.com/office/drawing/2010/main" w="9525">
+                <a14:hiddenLine xmlns:a14="http://schemas.microsoft.com/office/drawing/2010/main" xmlns="" w="9525">
                   <a:solidFill>
                     <a:srgbClr val="000000"/>
                   </a:solidFill>
@@ -3620,7 +3620,7 @@
             </a:ln>
             <a:extLst>
               <a:ext uri="{91240B29-F687-4f45-9708-019B960494DF}">
-                <a14:hiddenLine xmlns="" xmlns:a14="http://schemas.microsoft.com/office/drawing/2010/main" w="9525">
+                <a14:hiddenLine xmlns:a14="http://schemas.microsoft.com/office/drawing/2010/main" xmlns="" w="9525">
                   <a:solidFill>
                     <a:srgbClr val="000000"/>
                   </a:solidFill>
@@ -3685,7 +3685,7 @@
             </a:ln>
             <a:extLst>
               <a:ext uri="{91240B29-F687-4f45-9708-019B960494DF}">
-                <a14:hiddenLine xmlns="" xmlns:a14="http://schemas.microsoft.com/office/drawing/2010/main" w="9525">
+                <a14:hiddenLine xmlns:a14="http://schemas.microsoft.com/office/drawing/2010/main" xmlns="" w="9525">
                   <a:solidFill>
                     <a:srgbClr val="000000"/>
                   </a:solidFill>
@@ -3747,7 +3747,7 @@
             </a:ln>
             <a:extLst>
               <a:ext uri="{91240B29-F687-4f45-9708-019B960494DF}">
-                <a14:hiddenLine xmlns="" xmlns:a14="http://schemas.microsoft.com/office/drawing/2010/main" w="9525">
+                <a14:hiddenLine xmlns:a14="http://schemas.microsoft.com/office/drawing/2010/main" xmlns="" w="9525">
                   <a:solidFill>
                     <a:srgbClr val="000000"/>
                   </a:solidFill>
@@ -3837,7 +3837,7 @@
             </a:ln>
             <a:extLst>
               <a:ext uri="{91240B29-F687-4f45-9708-019B960494DF}">
-                <a14:hiddenLine xmlns="" xmlns:a14="http://schemas.microsoft.com/office/drawing/2010/main" w="9525">
+                <a14:hiddenLine xmlns:a14="http://schemas.microsoft.com/office/drawing/2010/main" xmlns="" w="9525">
                   <a:solidFill>
                     <a:srgbClr val="000000"/>
                   </a:solidFill>
@@ -3927,7 +3927,7 @@
             </a:ln>
             <a:extLst>
               <a:ext uri="{91240B29-F687-4f45-9708-019B960494DF}">
-                <a14:hiddenLine xmlns="" xmlns:a14="http://schemas.microsoft.com/office/drawing/2010/main" w="9525">
+                <a14:hiddenLine xmlns:a14="http://schemas.microsoft.com/office/drawing/2010/main" xmlns="" w="9525">
                   <a:solidFill>
                     <a:srgbClr val="000000"/>
                   </a:solidFill>
@@ -3989,7 +3989,7 @@
             </a:ln>
             <a:extLst>
               <a:ext uri="{91240B29-F687-4f45-9708-019B960494DF}">
-                <a14:hiddenLine xmlns="" xmlns:a14="http://schemas.microsoft.com/office/drawing/2010/main" w="9525">
+                <a14:hiddenLine xmlns:a14="http://schemas.microsoft.com/office/drawing/2010/main" xmlns="" w="9525">
                   <a:solidFill>
                     <a:srgbClr val="000000"/>
                   </a:solidFill>
@@ -4109,7 +4109,7 @@
             </a:ln>
             <a:extLst>
               <a:ext uri="{91240B29-F687-4f45-9708-019B960494DF}">
-                <a14:hiddenLine xmlns="" xmlns:a14="http://schemas.microsoft.com/office/drawing/2010/main" w="9525">
+                <a14:hiddenLine xmlns:a14="http://schemas.microsoft.com/office/drawing/2010/main" xmlns="" w="9525">
                   <a:solidFill>
                     <a:srgbClr val="000000"/>
                   </a:solidFill>
@@ -4177,7 +4177,7 @@
             </a:ln>
             <a:extLst>
               <a:ext uri="{91240B29-F687-4f45-9708-019B960494DF}">
-                <a14:hiddenLine xmlns="" xmlns:a14="http://schemas.microsoft.com/office/drawing/2010/main" w="9525">
+                <a14:hiddenLine xmlns:a14="http://schemas.microsoft.com/office/drawing/2010/main" xmlns="" w="9525">
                   <a:solidFill>
                     <a:srgbClr val="000000"/>
                   </a:solidFill>
@@ -4267,7 +4267,7 @@
             </a:ln>
             <a:extLst>
               <a:ext uri="{91240B29-F687-4f45-9708-019B960494DF}">
-                <a14:hiddenLine xmlns="" xmlns:a14="http://schemas.microsoft.com/office/drawing/2010/main" w="9525">
+                <a14:hiddenLine xmlns:a14="http://schemas.microsoft.com/office/drawing/2010/main" xmlns="" w="9525">
                   <a:solidFill>
                     <a:srgbClr val="000000"/>
                   </a:solidFill>
@@ -4407,7 +4407,7 @@
           <a:p>
             <a:fld id="{0EFDD11A-2701-4143-9214-BF779779D87D}" type="datetimeFigureOut">
               <a:rPr lang="en-US" smtClean="0"/>
-              <a:t>22-Jan-25</a:t>
+              <a:t>23-Jan-25</a:t>
             </a:fld>
             <a:endParaRPr lang="en-US"/>
           </a:p>
@@ -4674,7 +4674,7 @@
           <a:p>
             <a:fld id="{0EFDD11A-2701-4143-9214-BF779779D87D}" type="datetimeFigureOut">
               <a:rPr lang="en-US" smtClean="0"/>
-              <a:t>22-Jan-25</a:t>
+              <a:t>23-Jan-25</a:t>
             </a:fld>
             <a:endParaRPr lang="en-US"/>
           </a:p>
@@ -4870,7 +4870,7 @@
           <a:p>
             <a:fld id="{0EFDD11A-2701-4143-9214-BF779779D87D}" type="datetimeFigureOut">
               <a:rPr lang="en-US" smtClean="0"/>
-              <a:t>22-Jan-25</a:t>
+              <a:t>23-Jan-25</a:t>
             </a:fld>
             <a:endParaRPr lang="en-US"/>
           </a:p>
@@ -5133,7 +5133,7 @@
           <a:p>
             <a:fld id="{0EFDD11A-2701-4143-9214-BF779779D87D}" type="datetimeFigureOut">
               <a:rPr lang="en-US" smtClean="0"/>
-              <a:t>22-Jan-25</a:t>
+              <a:t>23-Jan-25</a:t>
             </a:fld>
             <a:endParaRPr lang="en-US"/>
           </a:p>
@@ -5567,7 +5567,7 @@
           <a:p>
             <a:fld id="{0EFDD11A-2701-4143-9214-BF779779D87D}" type="datetimeFigureOut">
               <a:rPr lang="en-US" smtClean="0"/>
-              <a:t>22-Jan-25</a:t>
+              <a:t>23-Jan-25</a:t>
             </a:fld>
             <a:endParaRPr lang="en-US"/>
           </a:p>
@@ -6113,7 +6113,7 @@
           <a:p>
             <a:fld id="{0EFDD11A-2701-4143-9214-BF779779D87D}" type="datetimeFigureOut">
               <a:rPr lang="en-US" smtClean="0"/>
-              <a:t>22-Jan-25</a:t>
+              <a:t>23-Jan-25</a:t>
             </a:fld>
             <a:endParaRPr lang="en-US"/>
           </a:p>
@@ -6833,7 +6833,7 @@
           <a:p>
             <a:fld id="{0EFDD11A-2701-4143-9214-BF779779D87D}" type="datetimeFigureOut">
               <a:rPr lang="en-US" smtClean="0"/>
-              <a:t>22-Jan-25</a:t>
+              <a:t>23-Jan-25</a:t>
             </a:fld>
             <a:endParaRPr lang="en-US"/>
           </a:p>
@@ -7003,7 +7003,7 @@
           <a:p>
             <a:fld id="{0EFDD11A-2701-4143-9214-BF779779D87D}" type="datetimeFigureOut">
               <a:rPr lang="en-US" smtClean="0"/>
-              <a:t>22-Jan-25</a:t>
+              <a:t>23-Jan-25</a:t>
             </a:fld>
             <a:endParaRPr lang="en-US"/>
           </a:p>
@@ -7183,7 +7183,7 @@
           <a:p>
             <a:fld id="{0EFDD11A-2701-4143-9214-BF779779D87D}" type="datetimeFigureOut">
               <a:rPr lang="en-US" smtClean="0"/>
-              <a:t>22-Jan-25</a:t>
+              <a:t>23-Jan-25</a:t>
             </a:fld>
             <a:endParaRPr lang="en-US"/>
           </a:p>
@@ -7353,7 +7353,7 @@
           <a:p>
             <a:fld id="{0EFDD11A-2701-4143-9214-BF779779D87D}" type="datetimeFigureOut">
               <a:rPr lang="en-US" smtClean="0"/>
-              <a:t>22-Jan-25</a:t>
+              <a:t>23-Jan-25</a:t>
             </a:fld>
             <a:endParaRPr lang="en-US"/>
           </a:p>
@@ -7603,7 +7603,7 @@
           <a:p>
             <a:fld id="{0EFDD11A-2701-4143-9214-BF779779D87D}" type="datetimeFigureOut">
               <a:rPr lang="en-US" smtClean="0"/>
-              <a:t>22-Jan-25</a:t>
+              <a:t>23-Jan-25</a:t>
             </a:fld>
             <a:endParaRPr lang="en-US"/>
           </a:p>
@@ -7835,7 +7835,7 @@
           <a:p>
             <a:fld id="{0EFDD11A-2701-4143-9214-BF779779D87D}" type="datetimeFigureOut">
               <a:rPr lang="en-US" smtClean="0"/>
-              <a:t>22-Jan-25</a:t>
+              <a:t>23-Jan-25</a:t>
             </a:fld>
             <a:endParaRPr lang="en-US"/>
           </a:p>
@@ -8216,7 +8216,7 @@
           <a:p>
             <a:fld id="{0EFDD11A-2701-4143-9214-BF779779D87D}" type="datetimeFigureOut">
               <a:rPr lang="en-US" smtClean="0"/>
-              <a:t>22-Jan-25</a:t>
+              <a:t>23-Jan-25</a:t>
             </a:fld>
             <a:endParaRPr lang="en-US"/>
           </a:p>
@@ -8334,7 +8334,7 @@
           <a:p>
             <a:fld id="{0EFDD11A-2701-4143-9214-BF779779D87D}" type="datetimeFigureOut">
               <a:rPr lang="en-US" smtClean="0"/>
-              <a:t>22-Jan-25</a:t>
+              <a:t>23-Jan-25</a:t>
             </a:fld>
             <a:endParaRPr lang="en-US"/>
           </a:p>
@@ -8429,7 +8429,7 @@
           <a:p>
             <a:fld id="{0EFDD11A-2701-4143-9214-BF779779D87D}" type="datetimeFigureOut">
               <a:rPr lang="en-US" smtClean="0"/>
-              <a:t>22-Jan-25</a:t>
+              <a:t>23-Jan-25</a:t>
             </a:fld>
             <a:endParaRPr lang="en-US"/>
           </a:p>
@@ -8678,7 +8678,7 @@
           <a:p>
             <a:fld id="{0EFDD11A-2701-4143-9214-BF779779D87D}" type="datetimeFigureOut">
               <a:rPr lang="en-US" smtClean="0"/>
-              <a:t>22-Jan-25</a:t>
+              <a:t>23-Jan-25</a:t>
             </a:fld>
             <a:endParaRPr lang="en-US"/>
           </a:p>
@@ -8958,7 +8958,7 @@
           <a:p>
             <a:fld id="{0EFDD11A-2701-4143-9214-BF779779D87D}" type="datetimeFigureOut">
               <a:rPr lang="en-US" smtClean="0"/>
-              <a:t>22-Jan-25</a:t>
+              <a:t>23-Jan-25</a:t>
             </a:fld>
             <a:endParaRPr lang="en-US"/>
           </a:p>
@@ -9081,7 +9081,7 @@
           <a:noFill/>
           <a:extLst>
             <a:ext uri="{909E8E84-426E-40dd-AFC4-6F175D3DCCD1}">
-              <a14:hiddenFill xmlns="" xmlns:a14="http://schemas.microsoft.com/office/drawing/2010/main">
+              <a14:hiddenFill xmlns:a14="http://schemas.microsoft.com/office/drawing/2010/main" xmlns="">
                 <a:solidFill>
                   <a:srgbClr val="FFFFFF"/>
                 </a:solidFill>
@@ -9155,7 +9155,7 @@
               </a:ln>
               <a:extLst>
                 <a:ext uri="{91240B29-F687-4f45-9708-019B960494DF}">
-                  <a14:hiddenLine xmlns="" xmlns:a14="http://schemas.microsoft.com/office/drawing/2010/main" w="9525">
+                  <a14:hiddenLine xmlns:a14="http://schemas.microsoft.com/office/drawing/2010/main" xmlns="" w="9525">
                     <a:solidFill>
                       <a:srgbClr val="000000"/>
                     </a:solidFill>
@@ -9245,7 +9245,7 @@
               </a:ln>
               <a:extLst>
                 <a:ext uri="{91240B29-F687-4f45-9708-019B960494DF}">
-                  <a14:hiddenLine xmlns="" xmlns:a14="http://schemas.microsoft.com/office/drawing/2010/main" w="9525">
+                  <a14:hiddenLine xmlns:a14="http://schemas.microsoft.com/office/drawing/2010/main" xmlns="" w="9525">
                     <a:solidFill>
                       <a:srgbClr val="000000"/>
                     </a:solidFill>
@@ -9335,7 +9335,7 @@
               </a:ln>
               <a:extLst>
                 <a:ext uri="{91240B29-F687-4f45-9708-019B960494DF}">
-                  <a14:hiddenLine xmlns="" xmlns:a14="http://schemas.microsoft.com/office/drawing/2010/main" w="9525">
+                  <a14:hiddenLine xmlns:a14="http://schemas.microsoft.com/office/drawing/2010/main" xmlns="" w="9525">
                     <a:solidFill>
                       <a:srgbClr val="000000"/>
                     </a:solidFill>
@@ -9397,7 +9397,7 @@
               </a:ln>
               <a:extLst>
                 <a:ext uri="{91240B29-F687-4f45-9708-019B960494DF}">
-                  <a14:hiddenLine xmlns="" xmlns:a14="http://schemas.microsoft.com/office/drawing/2010/main" w="9525">
+                  <a14:hiddenLine xmlns:a14="http://schemas.microsoft.com/office/drawing/2010/main" xmlns="" w="9525">
                     <a:solidFill>
                       <a:srgbClr val="000000"/>
                     </a:solidFill>
@@ -9487,7 +9487,7 @@
               </a:ln>
               <a:extLst>
                 <a:ext uri="{91240B29-F687-4f45-9708-019B960494DF}">
-                  <a14:hiddenLine xmlns="" xmlns:a14="http://schemas.microsoft.com/office/drawing/2010/main" w="9525">
+                  <a14:hiddenLine xmlns:a14="http://schemas.microsoft.com/office/drawing/2010/main" xmlns="" w="9525">
                     <a:solidFill>
                       <a:srgbClr val="000000"/>
                     </a:solidFill>
@@ -9549,7 +9549,7 @@
               </a:ln>
               <a:extLst>
                 <a:ext uri="{91240B29-F687-4f45-9708-019B960494DF}">
-                  <a14:hiddenLine xmlns="" xmlns:a14="http://schemas.microsoft.com/office/drawing/2010/main" w="9525">
+                  <a14:hiddenLine xmlns:a14="http://schemas.microsoft.com/office/drawing/2010/main" xmlns="" w="9525">
                     <a:solidFill>
                       <a:srgbClr val="000000"/>
                     </a:solidFill>
@@ -9611,7 +9611,7 @@
               </a:ln>
               <a:extLst>
                 <a:ext uri="{91240B29-F687-4f45-9708-019B960494DF}">
-                  <a14:hiddenLine xmlns="" xmlns:a14="http://schemas.microsoft.com/office/drawing/2010/main" w="9525">
+                  <a14:hiddenLine xmlns:a14="http://schemas.microsoft.com/office/drawing/2010/main" xmlns="" w="9525">
                     <a:solidFill>
                       <a:srgbClr val="000000"/>
                     </a:solidFill>
@@ -9701,7 +9701,7 @@
               </a:ln>
               <a:extLst>
                 <a:ext uri="{91240B29-F687-4f45-9708-019B960494DF}">
-                  <a14:hiddenLine xmlns="" xmlns:a14="http://schemas.microsoft.com/office/drawing/2010/main" w="9525">
+                  <a14:hiddenLine xmlns:a14="http://schemas.microsoft.com/office/drawing/2010/main" xmlns="" w="9525">
                     <a:solidFill>
                       <a:srgbClr val="000000"/>
                     </a:solidFill>
@@ -9791,7 +9791,7 @@
               </a:ln>
               <a:extLst>
                 <a:ext uri="{91240B29-F687-4f45-9708-019B960494DF}">
-                  <a14:hiddenLine xmlns="" xmlns:a14="http://schemas.microsoft.com/office/drawing/2010/main" w="9525">
+                  <a14:hiddenLine xmlns:a14="http://schemas.microsoft.com/office/drawing/2010/main" xmlns="" w="9525">
                     <a:solidFill>
                       <a:srgbClr val="000000"/>
                     </a:solidFill>
@@ -9853,7 +9853,7 @@
               </a:ln>
               <a:extLst>
                 <a:ext uri="{91240B29-F687-4f45-9708-019B960494DF}">
-                  <a14:hiddenLine xmlns="" xmlns:a14="http://schemas.microsoft.com/office/drawing/2010/main" w="9525">
+                  <a14:hiddenLine xmlns:a14="http://schemas.microsoft.com/office/drawing/2010/main" xmlns="" w="9525">
                     <a:solidFill>
                       <a:srgbClr val="000000"/>
                     </a:solidFill>
@@ -9963,7 +9963,7 @@
               </a:ln>
               <a:extLst>
                 <a:ext uri="{91240B29-F687-4f45-9708-019B960494DF}">
-                  <a14:hiddenLine xmlns="" xmlns:a14="http://schemas.microsoft.com/office/drawing/2010/main" w="9525">
+                  <a14:hiddenLine xmlns:a14="http://schemas.microsoft.com/office/drawing/2010/main" xmlns="" w="9525">
                     <a:solidFill>
                       <a:srgbClr val="000000"/>
                     </a:solidFill>
@@ -10047,7 +10047,7 @@
               </a:ln>
               <a:extLst>
                 <a:ext uri="{91240B29-F687-4f45-9708-019B960494DF}">
-                  <a14:hiddenLine xmlns="" xmlns:a14="http://schemas.microsoft.com/office/drawing/2010/main" w="9525">
+                  <a14:hiddenLine xmlns:a14="http://schemas.microsoft.com/office/drawing/2010/main" xmlns="" w="9525">
                     <a:solidFill>
                       <a:srgbClr val="000000"/>
                     </a:solidFill>
@@ -10109,7 +10109,7 @@
               </a:ln>
               <a:extLst>
                 <a:ext uri="{91240B29-F687-4f45-9708-019B960494DF}">
-                  <a14:hiddenLine xmlns="" xmlns:a14="http://schemas.microsoft.com/office/drawing/2010/main" w="9525">
+                  <a14:hiddenLine xmlns:a14="http://schemas.microsoft.com/office/drawing/2010/main" xmlns="" w="9525">
                     <a:solidFill>
                       <a:srgbClr val="000000"/>
                     </a:solidFill>
@@ -10171,7 +10171,7 @@
               </a:ln>
               <a:extLst>
                 <a:ext uri="{91240B29-F687-4f45-9708-019B960494DF}">
-                  <a14:hiddenLine xmlns="" xmlns:a14="http://schemas.microsoft.com/office/drawing/2010/main" w="9525">
+                  <a14:hiddenLine xmlns:a14="http://schemas.microsoft.com/office/drawing/2010/main" xmlns="" w="9525">
                     <a:solidFill>
                       <a:srgbClr val="000000"/>
                     </a:solidFill>
@@ -10261,7 +10261,7 @@
               </a:ln>
               <a:extLst>
                 <a:ext uri="{91240B29-F687-4f45-9708-019B960494DF}">
-                  <a14:hiddenLine xmlns="" xmlns:a14="http://schemas.microsoft.com/office/drawing/2010/main" w="9525">
+                  <a14:hiddenLine xmlns:a14="http://schemas.microsoft.com/office/drawing/2010/main" xmlns="" w="9525">
                     <a:solidFill>
                       <a:srgbClr val="000000"/>
                     </a:solidFill>
@@ -10295,7 +10295,7 @@
               </a:ln>
               <a:extLst>
                 <a:ext uri="{91240B29-F687-4f45-9708-019B960494DF}">
-                  <a14:hiddenLine xmlns="" xmlns:a14="http://schemas.microsoft.com/office/drawing/2010/main" w="9525">
+                  <a14:hiddenLine xmlns:a14="http://schemas.microsoft.com/office/drawing/2010/main" xmlns="" w="9525">
                     <a:solidFill>
                       <a:srgbClr val="000000"/>
                     </a:solidFill>
@@ -10360,7 +10360,7 @@
               </a:ln>
               <a:extLst>
                 <a:ext uri="{91240B29-F687-4f45-9708-019B960494DF}">
-                  <a14:hiddenLine xmlns="" xmlns:a14="http://schemas.microsoft.com/office/drawing/2010/main" w="9525">
+                  <a14:hiddenLine xmlns:a14="http://schemas.microsoft.com/office/drawing/2010/main" xmlns="" w="9525">
                     <a:solidFill>
                       <a:srgbClr val="000000"/>
                     </a:solidFill>
@@ -10450,7 +10450,7 @@
               </a:ln>
               <a:extLst>
                 <a:ext uri="{91240B29-F687-4f45-9708-019B960494DF}">
-                  <a14:hiddenLine xmlns="" xmlns:a14="http://schemas.microsoft.com/office/drawing/2010/main" w="9525">
+                  <a14:hiddenLine xmlns:a14="http://schemas.microsoft.com/office/drawing/2010/main" xmlns="" w="9525">
                     <a:solidFill>
                       <a:srgbClr val="000000"/>
                     </a:solidFill>
@@ -10512,7 +10512,7 @@
               </a:ln>
               <a:extLst>
                 <a:ext uri="{91240B29-F687-4f45-9708-019B960494DF}">
-                  <a14:hiddenLine xmlns="" xmlns:a14="http://schemas.microsoft.com/office/drawing/2010/main" w="9525">
+                  <a14:hiddenLine xmlns:a14="http://schemas.microsoft.com/office/drawing/2010/main" xmlns="" w="9525">
                     <a:solidFill>
                       <a:srgbClr val="000000"/>
                     </a:solidFill>
@@ -10602,7 +10602,7 @@
               </a:ln>
               <a:extLst>
                 <a:ext uri="{91240B29-F687-4f45-9708-019B960494DF}">
-                  <a14:hiddenLine xmlns="" xmlns:a14="http://schemas.microsoft.com/office/drawing/2010/main" w="9525">
+                  <a14:hiddenLine xmlns:a14="http://schemas.microsoft.com/office/drawing/2010/main" xmlns="" w="9525">
                     <a:solidFill>
                       <a:srgbClr val="000000"/>
                     </a:solidFill>
@@ -10667,7 +10667,7 @@
               </a:ln>
               <a:extLst>
                 <a:ext uri="{91240B29-F687-4f45-9708-019B960494DF}">
-                  <a14:hiddenLine xmlns="" xmlns:a14="http://schemas.microsoft.com/office/drawing/2010/main" w="9525">
+                  <a14:hiddenLine xmlns:a14="http://schemas.microsoft.com/office/drawing/2010/main" xmlns="" w="9525">
                     <a:solidFill>
                       <a:srgbClr val="000000"/>
                     </a:solidFill>
@@ -10729,7 +10729,7 @@
               </a:ln>
               <a:extLst>
                 <a:ext uri="{91240B29-F687-4f45-9708-019B960494DF}">
-                  <a14:hiddenLine xmlns="" xmlns:a14="http://schemas.microsoft.com/office/drawing/2010/main" w="9525">
+                  <a14:hiddenLine xmlns:a14="http://schemas.microsoft.com/office/drawing/2010/main" xmlns="" w="9525">
                     <a:solidFill>
                       <a:srgbClr val="000000"/>
                     </a:solidFill>
@@ -10819,7 +10819,7 @@
               </a:ln>
               <a:extLst>
                 <a:ext uri="{91240B29-F687-4f45-9708-019B960494DF}">
-                  <a14:hiddenLine xmlns="" xmlns:a14="http://schemas.microsoft.com/office/drawing/2010/main" w="9525">
+                  <a14:hiddenLine xmlns:a14="http://schemas.microsoft.com/office/drawing/2010/main" xmlns="" w="9525">
                     <a:solidFill>
                       <a:srgbClr val="000000"/>
                     </a:solidFill>
@@ -10909,7 +10909,7 @@
               </a:ln>
               <a:extLst>
                 <a:ext uri="{91240B29-F687-4f45-9708-019B960494DF}">
-                  <a14:hiddenLine xmlns="" xmlns:a14="http://schemas.microsoft.com/office/drawing/2010/main" w="9525">
+                  <a14:hiddenLine xmlns:a14="http://schemas.microsoft.com/office/drawing/2010/main" xmlns="" w="9525">
                     <a:solidFill>
                       <a:srgbClr val="000000"/>
                     </a:solidFill>
@@ -10974,7 +10974,7 @@
               </a:ln>
               <a:extLst>
                 <a:ext uri="{91240B29-F687-4f45-9708-019B960494DF}">
-                  <a14:hiddenLine xmlns="" xmlns:a14="http://schemas.microsoft.com/office/drawing/2010/main" w="9525">
+                  <a14:hiddenLine xmlns:a14="http://schemas.microsoft.com/office/drawing/2010/main" xmlns="" w="9525">
                     <a:solidFill>
                       <a:srgbClr val="000000"/>
                     </a:solidFill>
@@ -11094,7 +11094,7 @@
               </a:ln>
               <a:extLst>
                 <a:ext uri="{91240B29-F687-4f45-9708-019B960494DF}">
-                  <a14:hiddenLine xmlns="" xmlns:a14="http://schemas.microsoft.com/office/drawing/2010/main" w="9525">
+                  <a14:hiddenLine xmlns:a14="http://schemas.microsoft.com/office/drawing/2010/main" xmlns="" w="9525">
                     <a:solidFill>
                       <a:srgbClr val="000000"/>
                     </a:solidFill>
@@ -11175,7 +11175,7 @@
               </a:ln>
               <a:extLst>
                 <a:ext uri="{91240B29-F687-4f45-9708-019B960494DF}">
-                  <a14:hiddenLine xmlns="" xmlns:a14="http://schemas.microsoft.com/office/drawing/2010/main" w="9525">
+                  <a14:hiddenLine xmlns:a14="http://schemas.microsoft.com/office/drawing/2010/main" xmlns="" w="9525">
                     <a:solidFill>
                       <a:srgbClr val="000000"/>
                     </a:solidFill>
@@ -11290,7 +11290,7 @@
               </a:ln>
               <a:extLst>
                 <a:ext uri="{91240B29-F687-4f45-9708-019B960494DF}">
-                  <a14:hiddenLine xmlns="" xmlns:a14="http://schemas.microsoft.com/office/drawing/2010/main" w="9525">
+                  <a14:hiddenLine xmlns:a14="http://schemas.microsoft.com/office/drawing/2010/main" xmlns="" w="9525">
                     <a:solidFill>
                       <a:srgbClr val="000000"/>
                     </a:solidFill>
@@ -11380,7 +11380,7 @@
               </a:ln>
               <a:extLst>
                 <a:ext uri="{91240B29-F687-4f45-9708-019B960494DF}">
-                  <a14:hiddenLine xmlns="" xmlns:a14="http://schemas.microsoft.com/office/drawing/2010/main" w="9525">
+                  <a14:hiddenLine xmlns:a14="http://schemas.microsoft.com/office/drawing/2010/main" xmlns="" w="9525">
                     <a:solidFill>
                       <a:srgbClr val="000000"/>
                     </a:solidFill>
@@ -11445,7 +11445,7 @@
               </a:ln>
               <a:extLst>
                 <a:ext uri="{91240B29-F687-4f45-9708-019B960494DF}">
-                  <a14:hiddenLine xmlns="" xmlns:a14="http://schemas.microsoft.com/office/drawing/2010/main" w="9525">
+                  <a14:hiddenLine xmlns:a14="http://schemas.microsoft.com/office/drawing/2010/main" xmlns="" w="9525">
                     <a:solidFill>
                       <a:srgbClr val="000000"/>
                     </a:solidFill>
@@ -11535,7 +11535,7 @@
               </a:ln>
               <a:extLst>
                 <a:ext uri="{91240B29-F687-4f45-9708-019B960494DF}">
-                  <a14:hiddenLine xmlns="" xmlns:a14="http://schemas.microsoft.com/office/drawing/2010/main" w="9525">
+                  <a14:hiddenLine xmlns:a14="http://schemas.microsoft.com/office/drawing/2010/main" xmlns="" w="9525">
                     <a:solidFill>
                       <a:srgbClr val="000000"/>
                     </a:solidFill>
@@ -11603,7 +11603,7 @@
               </a:ln>
               <a:extLst>
                 <a:ext uri="{91240B29-F687-4f45-9708-019B960494DF}">
-                  <a14:hiddenLine xmlns="" xmlns:a14="http://schemas.microsoft.com/office/drawing/2010/main" w="9525">
+                  <a14:hiddenLine xmlns:a14="http://schemas.microsoft.com/office/drawing/2010/main" xmlns="" w="9525">
                     <a:solidFill>
                       <a:srgbClr val="000000"/>
                     </a:solidFill>
@@ -11693,7 +11693,7 @@
               </a:ln>
               <a:extLst>
                 <a:ext uri="{91240B29-F687-4f45-9708-019B960494DF}">
-                  <a14:hiddenLine xmlns="" xmlns:a14="http://schemas.microsoft.com/office/drawing/2010/main" w="9525">
+                  <a14:hiddenLine xmlns:a14="http://schemas.microsoft.com/office/drawing/2010/main" xmlns="" w="9525">
                     <a:solidFill>
                       <a:srgbClr val="000000"/>
                     </a:solidFill>
@@ -11761,7 +11761,7 @@
               </a:ln>
               <a:extLst>
                 <a:ext uri="{91240B29-F687-4f45-9708-019B960494DF}">
-                  <a14:hiddenLine xmlns="" xmlns:a14="http://schemas.microsoft.com/office/drawing/2010/main" w="9525">
+                  <a14:hiddenLine xmlns:a14="http://schemas.microsoft.com/office/drawing/2010/main" xmlns="" w="9525">
                     <a:solidFill>
                       <a:srgbClr val="000000"/>
                     </a:solidFill>
@@ -11851,7 +11851,7 @@
               </a:ln>
               <a:extLst>
                 <a:ext uri="{91240B29-F687-4f45-9708-019B960494DF}">
-                  <a14:hiddenLine xmlns="" xmlns:a14="http://schemas.microsoft.com/office/drawing/2010/main" w="9525">
+                  <a14:hiddenLine xmlns:a14="http://schemas.microsoft.com/office/drawing/2010/main" xmlns="" w="9525">
                     <a:solidFill>
                       <a:srgbClr val="000000"/>
                     </a:solidFill>
@@ -11885,7 +11885,7 @@
               </a:ln>
               <a:extLst>
                 <a:ext uri="{91240B29-F687-4f45-9708-019B960494DF}">
-                  <a14:hiddenLine xmlns="" xmlns:a14="http://schemas.microsoft.com/office/drawing/2010/main" w="9525">
+                  <a14:hiddenLine xmlns:a14="http://schemas.microsoft.com/office/drawing/2010/main" xmlns="" w="9525">
                     <a:solidFill>
                       <a:srgbClr val="000000"/>
                     </a:solidFill>
@@ -12025,7 +12025,7 @@
           <a:p>
             <a:fld id="{0EFDD11A-2701-4143-9214-BF779779D87D}" type="datetimeFigureOut">
               <a:rPr lang="en-US" smtClean="0"/>
-              <a:t>22-Jan-25</a:t>
+              <a:t>23-Jan-25</a:t>
             </a:fld>
             <a:endParaRPr lang="en-US"/>
           </a:p>
@@ -12851,6 +12851,134 @@
           </a:prstGeom>
         </p:spPr>
       </p:pic>
+      <p:sp>
+        <p:nvSpPr>
+          <p:cNvPr id="3" name="Title 1">
+            <a:extLst>
+              <a:ext uri="{FF2B5EF4-FFF2-40B4-BE49-F238E27FC236}">
+                <a16:creationId xmlns:a16="http://schemas.microsoft.com/office/drawing/2014/main" id="{3EDAEAEA-433E-52D9-D6FD-6D71CBB5B397}"/>
+              </a:ext>
+            </a:extLst>
+          </p:cNvPr>
+          <p:cNvSpPr txBox="1">
+            <a:spLocks/>
+          </p:cNvSpPr>
+          <p:nvPr/>
+        </p:nvSpPr>
+        <p:spPr>
+          <a:xfrm>
+            <a:off x="1934127" y="5006231"/>
+            <a:ext cx="2542408" cy="358723"/>
+          </a:xfrm>
+          <a:prstGeom prst="rect">
+            <a:avLst/>
+          </a:prstGeom>
+        </p:spPr>
+        <p:txBody>
+          <a:bodyPr vert="horz" lIns="91440" tIns="45720" rIns="91440" bIns="45720" rtlCol="0" anchor="b">
+            <a:normAutofit/>
+          </a:bodyPr>
+          <a:lstStyle>
+            <a:lvl1pPr algn="l" defTabSz="914400" rtl="0" eaLnBrk="1" latinLnBrk="0" hangingPunct="1">
+              <a:lnSpc>
+                <a:spcPct val="90000"/>
+              </a:lnSpc>
+              <a:spcBef>
+                <a:spcPct val="0"/>
+              </a:spcBef>
+              <a:buNone/>
+              <a:defRPr sz="4800" kern="1200" cap="all" baseline="0">
+                <a:solidFill>
+                  <a:schemeClr val="tx1"/>
+                </a:solidFill>
+                <a:latin typeface="+mj-lt"/>
+                <a:ea typeface="+mj-ea"/>
+                <a:cs typeface="+mj-cs"/>
+              </a:defRPr>
+            </a:lvl1pPr>
+          </a:lstStyle>
+          <a:p>
+            <a:r>
+              <a:rPr lang="en-US" sz="1600" cap="none" dirty="0">
+                <a:solidFill>
+                  <a:schemeClr val="bg1">
+                    <a:lumMod val="75000"/>
+                    <a:lumOff val="25000"/>
+                  </a:schemeClr>
+                </a:solidFill>
+                <a:latin typeface="Calibri" panose="020F0502020204030204" pitchFamily="34" charset="0"/>
+                <a:ea typeface="ADLaM Display" panose="02010000000000000000" pitchFamily="2" charset="0"/>
+                <a:cs typeface="Calibri" panose="020F0502020204030204" pitchFamily="34" charset="0"/>
+              </a:rPr>
+              <a:t>(a) On uploading video clip</a:t>
+            </a:r>
+          </a:p>
+        </p:txBody>
+      </p:sp>
+      <p:sp>
+        <p:nvSpPr>
+          <p:cNvPr id="5" name="Title 1">
+            <a:extLst>
+              <a:ext uri="{FF2B5EF4-FFF2-40B4-BE49-F238E27FC236}">
+                <a16:creationId xmlns:a16="http://schemas.microsoft.com/office/drawing/2014/main" id="{61E769C3-4FA7-B226-4612-74893E725704}"/>
+              </a:ext>
+            </a:extLst>
+          </p:cNvPr>
+          <p:cNvSpPr txBox="1">
+            <a:spLocks/>
+          </p:cNvSpPr>
+          <p:nvPr/>
+        </p:nvSpPr>
+        <p:spPr>
+          <a:xfrm>
+            <a:off x="7670083" y="5006231"/>
+            <a:ext cx="2905074" cy="358723"/>
+          </a:xfrm>
+          <a:prstGeom prst="rect">
+            <a:avLst/>
+          </a:prstGeom>
+        </p:spPr>
+        <p:txBody>
+          <a:bodyPr vert="horz" lIns="91440" tIns="45720" rIns="91440" bIns="45720" rtlCol="0" anchor="b">
+            <a:normAutofit/>
+          </a:bodyPr>
+          <a:lstStyle>
+            <a:lvl1pPr algn="l" defTabSz="914400" rtl="0" eaLnBrk="1" latinLnBrk="0" hangingPunct="1">
+              <a:lnSpc>
+                <a:spcPct val="90000"/>
+              </a:lnSpc>
+              <a:spcBef>
+                <a:spcPct val="0"/>
+              </a:spcBef>
+              <a:buNone/>
+              <a:defRPr sz="4800" kern="1200" cap="all" baseline="0">
+                <a:solidFill>
+                  <a:schemeClr val="tx1"/>
+                </a:solidFill>
+                <a:latin typeface="+mj-lt"/>
+                <a:ea typeface="+mj-ea"/>
+                <a:cs typeface="+mj-cs"/>
+              </a:defRPr>
+            </a:lvl1pPr>
+          </a:lstStyle>
+          <a:p>
+            <a:r>
+              <a:rPr lang="en-US" sz="1600" cap="none" dirty="0">
+                <a:solidFill>
+                  <a:schemeClr val="bg1">
+                    <a:lumMod val="75000"/>
+                    <a:lumOff val="25000"/>
+                  </a:schemeClr>
+                </a:solidFill>
+                <a:latin typeface="Calibri" panose="020F0502020204030204" pitchFamily="34" charset="0"/>
+                <a:ea typeface="ADLaM Display" panose="02010000000000000000" pitchFamily="2" charset="0"/>
+                <a:cs typeface="Calibri" panose="020F0502020204030204" pitchFamily="34" charset="0"/>
+              </a:rPr>
+              <a:t>(b) After Click on ‘Test’ button</a:t>
+            </a:r>
+          </a:p>
+        </p:txBody>
+      </p:sp>
     </p:spTree>
     <p:extLst>
       <p:ext uri="{BB962C8B-B14F-4D97-AF65-F5344CB8AC3E}">
@@ -13014,6 +13142,136 @@
           </a:prstGeom>
         </p:spPr>
       </p:pic>
+      <p:sp>
+        <p:nvSpPr>
+          <p:cNvPr id="3" name="Title 1">
+            <a:extLst>
+              <a:ext uri="{FF2B5EF4-FFF2-40B4-BE49-F238E27FC236}">
+                <a16:creationId xmlns:a16="http://schemas.microsoft.com/office/drawing/2014/main" id="{E3BBFD11-5471-1C46-651A-7F792C3FA74C}"/>
+              </a:ext>
+            </a:extLst>
+          </p:cNvPr>
+          <p:cNvSpPr txBox="1">
+            <a:spLocks/>
+          </p:cNvSpPr>
+          <p:nvPr/>
+        </p:nvSpPr>
+        <p:spPr>
+          <a:xfrm>
+            <a:off x="1822482" y="5062077"/>
+            <a:ext cx="2765693" cy="509666"/>
+          </a:xfrm>
+          <a:prstGeom prst="rect">
+            <a:avLst/>
+          </a:prstGeom>
+        </p:spPr>
+        <p:txBody>
+          <a:bodyPr vert="horz" lIns="91440" tIns="45720" rIns="91440" bIns="45720" rtlCol="0" anchor="b">
+            <a:normAutofit lnSpcReduction="10000"/>
+          </a:bodyPr>
+          <a:lstStyle>
+            <a:lvl1pPr algn="l" defTabSz="914400" rtl="0" eaLnBrk="1" latinLnBrk="0" hangingPunct="1">
+              <a:lnSpc>
+                <a:spcPct val="90000"/>
+              </a:lnSpc>
+              <a:spcBef>
+                <a:spcPct val="0"/>
+              </a:spcBef>
+              <a:buNone/>
+              <a:defRPr sz="4800" kern="1200" cap="all" baseline="0">
+                <a:solidFill>
+                  <a:schemeClr val="tx1"/>
+                </a:solidFill>
+                <a:latin typeface="+mj-lt"/>
+                <a:ea typeface="+mj-ea"/>
+                <a:cs typeface="+mj-cs"/>
+              </a:defRPr>
+            </a:lvl1pPr>
+          </a:lstStyle>
+          <a:p>
+            <a:pPr algn="ctr"/>
+            <a:r>
+              <a:rPr lang="en-US" sz="1600" cap="none" dirty="0">
+                <a:solidFill>
+                  <a:schemeClr val="bg1">
+                    <a:lumMod val="75000"/>
+                    <a:lumOff val="25000"/>
+                  </a:schemeClr>
+                </a:solidFill>
+                <a:latin typeface="Calibri" panose="020F0502020204030204" pitchFamily="34" charset="0"/>
+                <a:ea typeface="ADLaM Display" panose="02010000000000000000" pitchFamily="2" charset="0"/>
+                <a:cs typeface="Calibri" panose="020F0502020204030204" pitchFamily="34" charset="0"/>
+              </a:rPr>
+              <a:t>(c) Model started extracting number plates</a:t>
+            </a:r>
+          </a:p>
+        </p:txBody>
+      </p:sp>
+      <p:sp>
+        <p:nvSpPr>
+          <p:cNvPr id="4" name="Title 1">
+            <a:extLst>
+              <a:ext uri="{FF2B5EF4-FFF2-40B4-BE49-F238E27FC236}">
+                <a16:creationId xmlns:a16="http://schemas.microsoft.com/office/drawing/2014/main" id="{BBEC1BD8-9980-B654-BB64-446911954495}"/>
+              </a:ext>
+            </a:extLst>
+          </p:cNvPr>
+          <p:cNvSpPr txBox="1">
+            <a:spLocks/>
+          </p:cNvSpPr>
+          <p:nvPr/>
+        </p:nvSpPr>
+        <p:spPr>
+          <a:xfrm>
+            <a:off x="7674524" y="5098259"/>
+            <a:ext cx="2978252" cy="565512"/>
+          </a:xfrm>
+          <a:prstGeom prst="rect">
+            <a:avLst/>
+          </a:prstGeom>
+        </p:spPr>
+        <p:txBody>
+          <a:bodyPr vert="horz" lIns="91440" tIns="45720" rIns="91440" bIns="45720" rtlCol="0" anchor="b">
+            <a:normAutofit/>
+          </a:bodyPr>
+          <a:lstStyle>
+            <a:lvl1pPr algn="l" defTabSz="914400" rtl="0" eaLnBrk="1" latinLnBrk="0" hangingPunct="1">
+              <a:lnSpc>
+                <a:spcPct val="90000"/>
+              </a:lnSpc>
+              <a:spcBef>
+                <a:spcPct val="0"/>
+              </a:spcBef>
+              <a:buNone/>
+              <a:defRPr sz="4800" kern="1200" cap="all" baseline="0">
+                <a:solidFill>
+                  <a:schemeClr val="tx1"/>
+                </a:solidFill>
+                <a:latin typeface="+mj-lt"/>
+                <a:ea typeface="+mj-ea"/>
+                <a:cs typeface="+mj-cs"/>
+              </a:defRPr>
+            </a:lvl1pPr>
+          </a:lstStyle>
+          <a:p>
+            <a:pPr algn="ctr"/>
+            <a:r>
+              <a:rPr lang="en-US" sz="1600" cap="none" dirty="0">
+                <a:solidFill>
+                  <a:schemeClr val="bg1">
+                    <a:lumMod val="75000"/>
+                    <a:lumOff val="25000"/>
+                  </a:schemeClr>
+                </a:solidFill>
+                <a:latin typeface="Calibri" panose="020F0502020204030204" pitchFamily="34" charset="0"/>
+                <a:ea typeface="ADLaM Display" panose="02010000000000000000" pitchFamily="2" charset="0"/>
+                <a:cs typeface="Calibri" panose="020F0502020204030204" pitchFamily="34" charset="0"/>
+              </a:rPr>
+              <a:t>(d) Showing individual frame processing.</a:t>
+            </a:r>
+          </a:p>
+        </p:txBody>
+      </p:sp>
     </p:spTree>
     <p:extLst>
       <p:ext uri="{BB962C8B-B14F-4D97-AF65-F5344CB8AC3E}">
@@ -14870,14 +15128,14 @@
           <p:nvPr>
             <p:extLst>
               <p:ext uri="{D42A27DB-BD31-4B8C-83A1-F6EECF244321}">
-                <p14:modId xmlns:p14="http://schemas.microsoft.com/office/powerpoint/2010/main" val="667690564"/>
+                <p14:modId xmlns:p14="http://schemas.microsoft.com/office/powerpoint/2010/main" val="2207776384"/>
               </p:ext>
             </p:extLst>
           </p:nvPr>
         </p:nvGraphicFramePr>
         <p:xfrm>
-          <a:off x="4775635" y="1496596"/>
-          <a:ext cx="2640730" cy="4347909"/>
+          <a:off x="3646346" y="1575254"/>
+          <a:ext cx="4899308" cy="4347909"/>
         </p:xfrm>
         <a:graphic>
           <a:graphicData uri="http://schemas.openxmlformats.org/drawingml/2006/table">
@@ -14886,10 +15144,17 @@
                 <a:tableStyleId>{5C22544A-7EE6-4342-B048-85BDC9FD1C3A}</a:tableStyleId>
               </a:tblPr>
               <a:tblGrid>
-                <a:gridCol w="2640730">
+                <a:gridCol w="2449654">
                   <a:extLst>
                     <a:ext uri="{9D8B030D-6E8A-4147-A177-3AD203B41FA5}">
                       <a16:colId xmlns:a16="http://schemas.microsoft.com/office/drawing/2014/main" val="1054205809"/>
+                    </a:ext>
+                  </a:extLst>
+                </a:gridCol>
+                <a:gridCol w="2449654">
+                  <a:extLst>
+                    <a:ext uri="{9D8B030D-6E8A-4147-A177-3AD203B41FA5}">
+                      <a16:colId xmlns:a16="http://schemas.microsoft.com/office/drawing/2014/main" val="3988606784"/>
                     </a:ext>
                   </a:extLst>
                 </a:gridCol>
@@ -14900,7 +15165,7 @@
                     <a:bodyPr/>
                     <a:lstStyle/>
                     <a:p>
-                      <a:pPr marL="457200" algn="l">
+                      <a:pPr marL="457200" algn="ctr">
                         <a:lnSpc>
                           <a:spcPct val="150000"/>
                         </a:lnSpc>
@@ -14911,7 +15176,29 @@
                             <a:schemeClr val="bg1"/>
                           </a:solidFill>
                         </a:rPr>
-                        <a:t>Settings</a:t>
+                        <a:t>Parameter</a:t>
+                      </a:r>
+                    </a:p>
+                  </a:txBody>
+                  <a:tcPr/>
+                </a:tc>
+                <a:tc>
+                  <a:txBody>
+                    <a:bodyPr/>
+                    <a:lstStyle/>
+                    <a:p>
+                      <a:pPr marL="457200" algn="ctr">
+                        <a:lnSpc>
+                          <a:spcPct val="150000"/>
+                        </a:lnSpc>
+                      </a:pPr>
+                      <a:r>
+                        <a:rPr lang="en-US" sz="1600" dirty="0">
+                          <a:solidFill>
+                            <a:schemeClr val="bg1"/>
+                          </a:solidFill>
+                        </a:rPr>
+                        <a:t>Value</a:t>
                       </a:r>
                     </a:p>
                   </a:txBody>
@@ -14929,14 +15216,32 @@
                     <a:bodyPr/>
                     <a:lstStyle/>
                     <a:p>
-                      <a:pPr marL="457200" algn="l">
+                      <a:pPr marL="457200" algn="ctr">
                         <a:lnSpc>
                           <a:spcPct val="150000"/>
                         </a:lnSpc>
                       </a:pPr>
                       <a:r>
                         <a:rPr lang="en-US" sz="1600" dirty="0"/>
-                        <a:t>model = yolov8n.pt</a:t>
+                        <a:t>Model</a:t>
+                      </a:r>
+                    </a:p>
+                  </a:txBody>
+                  <a:tcPr/>
+                </a:tc>
+                <a:tc>
+                  <a:txBody>
+                    <a:bodyPr/>
+                    <a:lstStyle/>
+                    <a:p>
+                      <a:pPr marL="457200" algn="ctr">
+                        <a:lnSpc>
+                          <a:spcPct val="150000"/>
+                        </a:lnSpc>
+                      </a:pPr>
+                      <a:r>
+                        <a:rPr lang="en-US" sz="1600" dirty="0"/>
+                        <a:t>yolov8n.pt</a:t>
                       </a:r>
                     </a:p>
                   </a:txBody>
@@ -14954,7 +15259,7 @@
                     <a:bodyPr/>
                     <a:lstStyle/>
                     <a:p>
-                      <a:pPr marL="457200" marR="0" lvl="0" indent="0" algn="l" defTabSz="914400" rtl="0" eaLnBrk="1" fontAlgn="auto" latinLnBrk="0" hangingPunct="1">
+                      <a:pPr marL="457200" marR="0" lvl="0" indent="0" algn="ctr" defTabSz="914400" rtl="0" eaLnBrk="1" fontAlgn="auto" latinLnBrk="0" hangingPunct="1">
                         <a:lnSpc>
                           <a:spcPct val="150000"/>
                         </a:lnSpc>
@@ -14973,33 +15278,18 @@
                       </a:pPr>
                       <a:r>
                         <a:rPr lang="en-US" sz="1600" dirty="0"/>
-                        <a:t> </a:t>
-                      </a:r>
-                      <a:r>
-                        <a:rPr lang="en-US" sz="1600" dirty="0" err="1"/>
-                        <a:t>imgsz</a:t>
-                      </a:r>
-                      <a:r>
-                        <a:rPr lang="en-US" sz="1600" dirty="0"/>
-                        <a:t> = 640</a:t>
+                        <a:t>Image Size</a:t>
                       </a:r>
                     </a:p>
                   </a:txBody>
                   <a:tcPr/>
                 </a:tc>
-                <a:extLst>
-                  <a:ext uri="{0D108BD9-81ED-4DB2-BD59-A6C34878D82A}">
-                    <a16:rowId xmlns:a16="http://schemas.microsoft.com/office/drawing/2014/main" val="3178900567"/>
-                  </a:ext>
-                </a:extLst>
-              </a:tr>
-              <a:tr h="483101">
                 <a:tc>
                   <a:txBody>
                     <a:bodyPr/>
                     <a:lstStyle/>
                     <a:p>
-                      <a:pPr marL="457200" marR="0" lvl="0" indent="0" algn="l" defTabSz="914400" rtl="0" eaLnBrk="1" fontAlgn="auto" latinLnBrk="0" hangingPunct="1">
+                      <a:pPr marL="457200" marR="0" lvl="0" indent="0" algn="ctr" defTabSz="914400" rtl="0" eaLnBrk="1" fontAlgn="auto" latinLnBrk="0" hangingPunct="1">
                         <a:lnSpc>
                           <a:spcPct val="150000"/>
                         </a:lnSpc>
@@ -15018,7 +15308,74 @@
                       </a:pPr>
                       <a:r>
                         <a:rPr lang="en-US" sz="1600" dirty="0"/>
-                        <a:t>batch = 16</a:t>
+                        <a:t>640</a:t>
+                      </a:r>
+                    </a:p>
+                  </a:txBody>
+                  <a:tcPr/>
+                </a:tc>
+                <a:extLst>
+                  <a:ext uri="{0D108BD9-81ED-4DB2-BD59-A6C34878D82A}">
+                    <a16:rowId xmlns:a16="http://schemas.microsoft.com/office/drawing/2014/main" val="3178900567"/>
+                  </a:ext>
+                </a:extLst>
+              </a:tr>
+              <a:tr h="483101">
+                <a:tc>
+                  <a:txBody>
+                    <a:bodyPr/>
+                    <a:lstStyle/>
+                    <a:p>
+                      <a:pPr marL="457200" marR="0" lvl="0" indent="0" algn="ctr" defTabSz="914400" rtl="0" eaLnBrk="1" fontAlgn="auto" latinLnBrk="0" hangingPunct="1">
+                        <a:lnSpc>
+                          <a:spcPct val="150000"/>
+                        </a:lnSpc>
+                        <a:spcBef>
+                          <a:spcPts val="0"/>
+                        </a:spcBef>
+                        <a:spcAft>
+                          <a:spcPts val="0"/>
+                        </a:spcAft>
+                        <a:buClrTx/>
+                        <a:buSzTx/>
+                        <a:buFontTx/>
+                        <a:buNone/>
+                        <a:tabLst/>
+                        <a:defRPr/>
+                      </a:pPr>
+                      <a:r>
+                        <a:rPr lang="en-US" sz="1600" dirty="0"/>
+                        <a:t>Batch Size</a:t>
+                      </a:r>
+                    </a:p>
+                  </a:txBody>
+                  <a:tcPr/>
+                </a:tc>
+                <a:tc>
+                  <a:txBody>
+                    <a:bodyPr/>
+                    <a:lstStyle/>
+                    <a:p>
+                      <a:pPr marL="457200" marR="0" lvl="0" indent="0" algn="ctr" defTabSz="914400" rtl="0" eaLnBrk="1" fontAlgn="auto" latinLnBrk="0" hangingPunct="1">
+                        <a:lnSpc>
+                          <a:spcPct val="150000"/>
+                        </a:lnSpc>
+                        <a:spcBef>
+                          <a:spcPts val="0"/>
+                        </a:spcBef>
+                        <a:spcAft>
+                          <a:spcPts val="0"/>
+                        </a:spcAft>
+                        <a:buClrTx/>
+                        <a:buSzTx/>
+                        <a:buFontTx/>
+                        <a:buNone/>
+                        <a:tabLst/>
+                        <a:defRPr/>
+                      </a:pPr>
+                      <a:r>
+                        <a:rPr lang="en-US" sz="1600" dirty="0"/>
+                        <a:t>16</a:t>
                       </a:r>
                     </a:p>
                   </a:txBody>
@@ -15036,14 +15393,32 @@
                     <a:bodyPr/>
                     <a:lstStyle/>
                     <a:p>
-                      <a:pPr marL="457200" algn="l">
+                      <a:pPr marL="457200" algn="ctr">
                         <a:lnSpc>
                           <a:spcPct val="150000"/>
                         </a:lnSpc>
                       </a:pPr>
                       <a:r>
                         <a:rPr lang="en-US" sz="1600" dirty="0"/>
-                        <a:t>epochs = 20</a:t>
+                        <a:t>Epochs</a:t>
+                      </a:r>
+                    </a:p>
+                  </a:txBody>
+                  <a:tcPr/>
+                </a:tc>
+                <a:tc>
+                  <a:txBody>
+                    <a:bodyPr/>
+                    <a:lstStyle/>
+                    <a:p>
+                      <a:pPr marL="457200" algn="ctr">
+                        <a:lnSpc>
+                          <a:spcPct val="150000"/>
+                        </a:lnSpc>
+                      </a:pPr>
+                      <a:r>
+                        <a:rPr lang="en-US" sz="1600" dirty="0"/>
+                        <a:t>20</a:t>
                       </a:r>
                     </a:p>
                   </a:txBody>
@@ -15061,14 +15436,32 @@
                     <a:bodyPr/>
                     <a:lstStyle/>
                     <a:p>
-                      <a:pPr marL="457200" algn="l">
+                      <a:pPr marL="457200" algn="ctr">
                         <a:lnSpc>
                           <a:spcPct val="150000"/>
                         </a:lnSpc>
                       </a:pPr>
                       <a:r>
                         <a:rPr lang="en-US" sz="1600" dirty="0"/>
-                        <a:t>optimizer = SGD</a:t>
+                        <a:t>Optimizer</a:t>
+                      </a:r>
+                    </a:p>
+                  </a:txBody>
+                  <a:tcPr/>
+                </a:tc>
+                <a:tc>
+                  <a:txBody>
+                    <a:bodyPr/>
+                    <a:lstStyle/>
+                    <a:p>
+                      <a:pPr marL="457200" algn="ctr">
+                        <a:lnSpc>
+                          <a:spcPct val="150000"/>
+                        </a:lnSpc>
+                      </a:pPr>
+                      <a:r>
+                        <a:rPr lang="en-US" sz="1600" dirty="0"/>
+                        <a:t>SGD</a:t>
                       </a:r>
                     </a:p>
                   </a:txBody>
@@ -15086,14 +15479,32 @@
                     <a:bodyPr/>
                     <a:lstStyle/>
                     <a:p>
-                      <a:pPr marL="457200" algn="l">
+                      <a:pPr marL="457200" algn="ctr">
                         <a:lnSpc>
                           <a:spcPct val="150000"/>
                         </a:lnSpc>
                       </a:pPr>
                       <a:r>
                         <a:rPr lang="en-US" sz="1600" dirty="0"/>
-                        <a:t>dropout = 0.0</a:t>
+                        <a:t>Dropout</a:t>
+                      </a:r>
+                    </a:p>
+                  </a:txBody>
+                  <a:tcPr/>
+                </a:tc>
+                <a:tc>
+                  <a:txBody>
+                    <a:bodyPr/>
+                    <a:lstStyle/>
+                    <a:p>
+                      <a:pPr marL="457200" algn="ctr">
+                        <a:lnSpc>
+                          <a:spcPct val="150000"/>
+                        </a:lnSpc>
+                      </a:pPr>
+                      <a:r>
+                        <a:rPr lang="en-US" sz="1600" dirty="0"/>
+                        <a:t>0.0</a:t>
                       </a:r>
                     </a:p>
                   </a:txBody>
@@ -15111,18 +15522,32 @@
                     <a:bodyPr/>
                     <a:lstStyle/>
                     <a:p>
-                      <a:pPr marL="457200" algn="l">
+                      <a:pPr marL="457200" algn="ctr">
                         <a:lnSpc>
                           <a:spcPct val="150000"/>
                         </a:lnSpc>
                       </a:pPr>
                       <a:r>
-                        <a:rPr lang="en-US" sz="1600" dirty="0" err="1"/>
-                        <a:t>lr</a:t>
+                        <a:rPr lang="en-US" sz="1600" dirty="0"/>
+                        <a:t>Learning Rate</a:t>
                       </a:r>
+                    </a:p>
+                  </a:txBody>
+                  <a:tcPr/>
+                </a:tc>
+                <a:tc>
+                  <a:txBody>
+                    <a:bodyPr/>
+                    <a:lstStyle/>
+                    <a:p>
+                      <a:pPr marL="457200" algn="ctr">
+                        <a:lnSpc>
+                          <a:spcPct val="150000"/>
+                        </a:lnSpc>
+                      </a:pPr>
                       <a:r>
                         <a:rPr lang="en-US" sz="1600" dirty="0"/>
-                        <a:t> = 0.01</a:t>
+                        <a:t>0.01</a:t>
                       </a:r>
                     </a:p>
                   </a:txBody>
@@ -15140,18 +15565,32 @@
                     <a:bodyPr/>
                     <a:lstStyle/>
                     <a:p>
-                      <a:pPr marL="457200" algn="l">
+                      <a:pPr marL="457200" algn="ctr">
                         <a:lnSpc>
                           <a:spcPct val="150000"/>
                         </a:lnSpc>
                       </a:pPr>
                       <a:r>
-                        <a:rPr lang="en-US" sz="1600" dirty="0" err="1"/>
-                        <a:t>iou</a:t>
+                        <a:rPr lang="en-US" sz="1600" dirty="0"/>
+                        <a:t>IOU</a:t>
                       </a:r>
+                    </a:p>
+                  </a:txBody>
+                  <a:tcPr/>
+                </a:tc>
+                <a:tc>
+                  <a:txBody>
+                    <a:bodyPr/>
+                    <a:lstStyle/>
+                    <a:p>
+                      <a:pPr marL="457200" algn="ctr">
+                        <a:lnSpc>
+                          <a:spcPct val="150000"/>
+                        </a:lnSpc>
+                      </a:pPr>
                       <a:r>
                         <a:rPr lang="en-US" sz="1600" dirty="0"/>
-                        <a:t> = 0.7 (for NMS)</a:t>
+                        <a:t>0.7 (for NMS)</a:t>
                       </a:r>
                     </a:p>
                   </a:txBody>
@@ -15400,14 +15839,14 @@
           <p:nvPr>
             <p:extLst>
               <p:ext uri="{D42A27DB-BD31-4B8C-83A1-F6EECF244321}">
-                <p14:modId xmlns:p14="http://schemas.microsoft.com/office/powerpoint/2010/main" val="1106884219"/>
+                <p14:modId xmlns:p14="http://schemas.microsoft.com/office/powerpoint/2010/main" val="2530005807"/>
               </p:ext>
             </p:extLst>
           </p:nvPr>
         </p:nvGraphicFramePr>
         <p:xfrm>
-          <a:off x="4775635" y="1496596"/>
-          <a:ext cx="2640730" cy="3864808"/>
+          <a:off x="3813495" y="1732570"/>
+          <a:ext cx="4565010" cy="3864808"/>
         </p:xfrm>
         <a:graphic>
           <a:graphicData uri="http://schemas.openxmlformats.org/drawingml/2006/table">
@@ -15416,21 +15855,28 @@
                 <a:tableStyleId>{5C22544A-7EE6-4342-B048-85BDC9FD1C3A}</a:tableStyleId>
               </a:tblPr>
               <a:tblGrid>
-                <a:gridCol w="2640730">
+                <a:gridCol w="2282505">
                   <a:extLst>
                     <a:ext uri="{9D8B030D-6E8A-4147-A177-3AD203B41FA5}">
                       <a16:colId xmlns:a16="http://schemas.microsoft.com/office/drawing/2014/main" val="1054205809"/>
                     </a:ext>
                   </a:extLst>
                 </a:gridCol>
+                <a:gridCol w="2282505">
+                  <a:extLst>
+                    <a:ext uri="{9D8B030D-6E8A-4147-A177-3AD203B41FA5}">
+                      <a16:colId xmlns:a16="http://schemas.microsoft.com/office/drawing/2014/main" val="805700959"/>
+                    </a:ext>
+                  </a:extLst>
+                </a:gridCol>
               </a:tblGrid>
               <a:tr h="483101">
-                <a:tc>
+                <a:tc gridSpan="2">
                   <a:txBody>
                     <a:bodyPr/>
                     <a:lstStyle/>
                     <a:p>
-                      <a:pPr marL="457200" algn="l">
+                      <a:pPr marL="457200" algn="ctr">
                         <a:lnSpc>
                           <a:spcPct val="150000"/>
                         </a:lnSpc>
@@ -15447,6 +15893,25 @@
                   </a:txBody>
                   <a:tcPr/>
                 </a:tc>
+                <a:tc hMerge="1">
+                  <a:txBody>
+                    <a:bodyPr/>
+                    <a:lstStyle/>
+                    <a:p>
+                      <a:pPr marL="457200" algn="l">
+                        <a:lnSpc>
+                          <a:spcPct val="150000"/>
+                        </a:lnSpc>
+                      </a:pPr>
+                      <a:endParaRPr lang="en-US" sz="1600" dirty="0">
+                        <a:solidFill>
+                          <a:schemeClr val="bg1"/>
+                        </a:solidFill>
+                      </a:endParaRPr>
+                    </a:p>
+                  </a:txBody>
+                  <a:tcPr/>
+                </a:tc>
                 <a:extLst>
                   <a:ext uri="{0D108BD9-81ED-4DB2-BD59-A6C34878D82A}">
                     <a16:rowId xmlns:a16="http://schemas.microsoft.com/office/drawing/2014/main" val="2352360391"/>
@@ -15459,14 +15924,32 @@
                     <a:bodyPr/>
                     <a:lstStyle/>
                     <a:p>
-                      <a:pPr marL="457200" algn="l">
+                      <a:pPr marL="457200" algn="ctr">
                         <a:lnSpc>
                           <a:spcPct val="150000"/>
                         </a:lnSpc>
                       </a:pPr>
                       <a:r>
                         <a:rPr lang="en-US" sz="1600" dirty="0"/>
-                        <a:t>Class = all</a:t>
+                        <a:t>Class</a:t>
+                      </a:r>
+                    </a:p>
+                  </a:txBody>
+                  <a:tcPr/>
+                </a:tc>
+                <a:tc>
+                  <a:txBody>
+                    <a:bodyPr/>
+                    <a:lstStyle/>
+                    <a:p>
+                      <a:pPr marL="457200" algn="ctr">
+                        <a:lnSpc>
+                          <a:spcPct val="150000"/>
+                        </a:lnSpc>
+                      </a:pPr>
+                      <a:r>
+                        <a:rPr lang="en-US" sz="1600" dirty="0"/>
+                        <a:t>All</a:t>
                       </a:r>
                     </a:p>
                   </a:txBody>
@@ -15484,7 +15967,7 @@
                     <a:bodyPr/>
                     <a:lstStyle/>
                     <a:p>
-                      <a:pPr marL="457200" marR="0" lvl="0" indent="0" algn="l" defTabSz="914400" rtl="0" eaLnBrk="1" fontAlgn="auto" latinLnBrk="0" hangingPunct="1">
+                      <a:pPr marL="457200" marR="0" lvl="0" indent="0" algn="ctr" defTabSz="914400" rtl="0" eaLnBrk="1" fontAlgn="auto" latinLnBrk="0" hangingPunct="1">
                         <a:lnSpc>
                           <a:spcPct val="150000"/>
                         </a:lnSpc>
@@ -15503,25 +15986,18 @@
                       </a:pPr>
                       <a:r>
                         <a:rPr lang="en-US" sz="1600" dirty="0"/>
-                        <a:t>Images = 2046</a:t>
+                        <a:t>Images</a:t>
                       </a:r>
                     </a:p>
                   </a:txBody>
                   <a:tcPr/>
                 </a:tc>
-                <a:extLst>
-                  <a:ext uri="{0D108BD9-81ED-4DB2-BD59-A6C34878D82A}">
-                    <a16:rowId xmlns:a16="http://schemas.microsoft.com/office/drawing/2014/main" val="3178900567"/>
-                  </a:ext>
-                </a:extLst>
-              </a:tr>
-              <a:tr h="483101">
                 <a:tc>
                   <a:txBody>
                     <a:bodyPr/>
                     <a:lstStyle/>
                     <a:p>
-                      <a:pPr marL="457200" marR="0" lvl="0" indent="0" algn="l" defTabSz="914400" rtl="0" eaLnBrk="1" fontAlgn="auto" latinLnBrk="0" hangingPunct="1">
+                      <a:pPr marL="457200" marR="0" lvl="0" indent="0" algn="ctr" defTabSz="914400" rtl="0" eaLnBrk="1" fontAlgn="auto" latinLnBrk="0" hangingPunct="1">
                         <a:lnSpc>
                           <a:spcPct val="150000"/>
                         </a:lnSpc>
@@ -15540,7 +16016,74 @@
                       </a:pPr>
                       <a:r>
                         <a:rPr lang="en-US" sz="1600" dirty="0"/>
-                        <a:t>Instances = 2132</a:t>
+                        <a:t>2046</a:t>
+                      </a:r>
+                    </a:p>
+                  </a:txBody>
+                  <a:tcPr/>
+                </a:tc>
+                <a:extLst>
+                  <a:ext uri="{0D108BD9-81ED-4DB2-BD59-A6C34878D82A}">
+                    <a16:rowId xmlns:a16="http://schemas.microsoft.com/office/drawing/2014/main" val="3178900567"/>
+                  </a:ext>
+                </a:extLst>
+              </a:tr>
+              <a:tr h="483101">
+                <a:tc>
+                  <a:txBody>
+                    <a:bodyPr/>
+                    <a:lstStyle/>
+                    <a:p>
+                      <a:pPr marL="457200" marR="0" lvl="0" indent="0" algn="ctr" defTabSz="914400" rtl="0" eaLnBrk="1" fontAlgn="auto" latinLnBrk="0" hangingPunct="1">
+                        <a:lnSpc>
+                          <a:spcPct val="150000"/>
+                        </a:lnSpc>
+                        <a:spcBef>
+                          <a:spcPts val="0"/>
+                        </a:spcBef>
+                        <a:spcAft>
+                          <a:spcPts val="0"/>
+                        </a:spcAft>
+                        <a:buClrTx/>
+                        <a:buSzTx/>
+                        <a:buFontTx/>
+                        <a:buNone/>
+                        <a:tabLst/>
+                        <a:defRPr/>
+                      </a:pPr>
+                      <a:r>
+                        <a:rPr lang="en-US" sz="1600" dirty="0"/>
+                        <a:t>Instances</a:t>
+                      </a:r>
+                    </a:p>
+                  </a:txBody>
+                  <a:tcPr/>
+                </a:tc>
+                <a:tc>
+                  <a:txBody>
+                    <a:bodyPr/>
+                    <a:lstStyle/>
+                    <a:p>
+                      <a:pPr marL="457200" marR="0" lvl="0" indent="0" algn="ctr" defTabSz="914400" rtl="0" eaLnBrk="1" fontAlgn="auto" latinLnBrk="0" hangingPunct="1">
+                        <a:lnSpc>
+                          <a:spcPct val="150000"/>
+                        </a:lnSpc>
+                        <a:spcBef>
+                          <a:spcPts val="0"/>
+                        </a:spcBef>
+                        <a:spcAft>
+                          <a:spcPts val="0"/>
+                        </a:spcAft>
+                        <a:buClrTx/>
+                        <a:buSzTx/>
+                        <a:buFontTx/>
+                        <a:buNone/>
+                        <a:tabLst/>
+                        <a:defRPr/>
+                      </a:pPr>
+                      <a:r>
+                        <a:rPr lang="en-US" sz="1600" dirty="0"/>
+                        <a:t>2132</a:t>
                       </a:r>
                     </a:p>
                   </a:txBody>
@@ -15558,14 +16101,32 @@
                     <a:bodyPr/>
                     <a:lstStyle/>
                     <a:p>
-                      <a:pPr marL="457200" algn="l">
+                      <a:pPr marL="457200" algn="ctr">
                         <a:lnSpc>
                           <a:spcPct val="150000"/>
                         </a:lnSpc>
                       </a:pPr>
                       <a:r>
                         <a:rPr lang="en-US" sz="1600" dirty="0"/>
-                        <a:t>Box-Precision = 0.974</a:t>
+                        <a:t>Box-Precision</a:t>
+                      </a:r>
+                    </a:p>
+                  </a:txBody>
+                  <a:tcPr/>
+                </a:tc>
+                <a:tc>
+                  <a:txBody>
+                    <a:bodyPr/>
+                    <a:lstStyle/>
+                    <a:p>
+                      <a:pPr marL="457200" algn="ctr">
+                        <a:lnSpc>
+                          <a:spcPct val="150000"/>
+                        </a:lnSpc>
+                      </a:pPr>
+                      <a:r>
+                        <a:rPr lang="en-US" sz="1600" dirty="0"/>
+                        <a:t>0.974</a:t>
                       </a:r>
                     </a:p>
                   </a:txBody>
@@ -15583,14 +16144,32 @@
                     <a:bodyPr/>
                     <a:lstStyle/>
                     <a:p>
-                      <a:pPr marL="457200" algn="l">
+                      <a:pPr marL="457200" algn="ctr">
                         <a:lnSpc>
                           <a:spcPct val="150000"/>
                         </a:lnSpc>
                       </a:pPr>
                       <a:r>
                         <a:rPr lang="en-US" sz="1600" dirty="0"/>
-                        <a:t>Box-Recall = 0.963</a:t>
+                        <a:t>Box-Recall</a:t>
+                      </a:r>
+                    </a:p>
+                  </a:txBody>
+                  <a:tcPr/>
+                </a:tc>
+                <a:tc>
+                  <a:txBody>
+                    <a:bodyPr/>
+                    <a:lstStyle/>
+                    <a:p>
+                      <a:pPr marL="457200" algn="ctr">
+                        <a:lnSpc>
+                          <a:spcPct val="150000"/>
+                        </a:lnSpc>
+                      </a:pPr>
+                      <a:r>
+                        <a:rPr lang="en-US" sz="1600" dirty="0"/>
+                        <a:t>0.963</a:t>
                       </a:r>
                     </a:p>
                   </a:txBody>
@@ -15608,14 +16187,32 @@
                     <a:bodyPr/>
                     <a:lstStyle/>
                     <a:p>
-                      <a:pPr marL="457200" algn="l">
+                      <a:pPr marL="457200" algn="ctr">
                         <a:lnSpc>
                           <a:spcPct val="150000"/>
                         </a:lnSpc>
                       </a:pPr>
                       <a:r>
                         <a:rPr lang="en-US" sz="1600" dirty="0"/>
-                        <a:t>mAP50 = 0.983</a:t>
+                        <a:t>mAP50</a:t>
+                      </a:r>
+                    </a:p>
+                  </a:txBody>
+                  <a:tcPr/>
+                </a:tc>
+                <a:tc>
+                  <a:txBody>
+                    <a:bodyPr/>
+                    <a:lstStyle/>
+                    <a:p>
+                      <a:pPr marL="457200" algn="ctr">
+                        <a:lnSpc>
+                          <a:spcPct val="150000"/>
+                        </a:lnSpc>
+                      </a:pPr>
+                      <a:r>
+                        <a:rPr lang="en-US" sz="1600" dirty="0"/>
+                        <a:t>0.983</a:t>
                       </a:r>
                     </a:p>
                   </a:txBody>
@@ -15633,14 +16230,32 @@
                     <a:bodyPr/>
                     <a:lstStyle/>
                     <a:p>
-                      <a:pPr marL="457200" algn="l">
+                      <a:pPr marL="457200" algn="ctr">
                         <a:lnSpc>
                           <a:spcPct val="150000"/>
                         </a:lnSpc>
                       </a:pPr>
                       <a:r>
                         <a:rPr lang="en-US" sz="1600" dirty="0"/>
-                        <a:t>mAP50-90 = 0.701</a:t>
+                        <a:t>mAP50-90</a:t>
+                      </a:r>
+                    </a:p>
+                  </a:txBody>
+                  <a:tcPr/>
+                </a:tc>
+                <a:tc>
+                  <a:txBody>
+                    <a:bodyPr/>
+                    <a:lstStyle/>
+                    <a:p>
+                      <a:pPr marL="457200" algn="ctr">
+                        <a:lnSpc>
+                          <a:spcPct val="150000"/>
+                        </a:lnSpc>
+                      </a:pPr>
+                      <a:r>
+                        <a:rPr lang="en-US" sz="1600" dirty="0"/>
+                        <a:t>0.701</a:t>
                       </a:r>
                     </a:p>
                   </a:txBody>

</xml_diff>